<commit_message>
Replaced 'ASP.NET 5' with 'ASP.NET Core 1.0' and '.NET Core 5' with '.NET Core 1.0'
</commit_message>
<xml_diff>
--- a/Presentation/01-Keynote/Keynote.pptx
+++ b/Presentation/01-Keynote/Keynote.pptx
@@ -233,7 +233,7 @@
           <a:p>
             <a:fld id="{0E990FE3-7537-4D15-A9F5-FDF1805FD5F8}" type="datetimeFigureOut">
               <a:rPr lang="en-US" smtClean="0"/>
-              <a:t>18/12/2015</a:t>
+              <a:t>1/25/2016</a:t>
             </a:fld>
             <a:endParaRPr lang="en-US"/>
           </a:p>
@@ -1089,7 +1089,7 @@
           <a:p>
             <a:fld id="{50A28030-5D59-4E14-AFE9-B93D391AF3AF}" type="datetime1">
               <a:rPr lang="en-US" smtClean="0"/>
-              <a:t>18/12/2015</a:t>
+              <a:t>1/25/2016</a:t>
             </a:fld>
             <a:endParaRPr lang="en-US" dirty="0"/>
           </a:p>
@@ -1391,13 +1391,6 @@
   <p:clrMapOvr>
     <a:masterClrMapping/>
   </p:clrMapOvr>
-  <p:timing>
-    <p:tnLst>
-      <p:par>
-        <p:cTn id="1" dur="indefinite" restart="never" nodeType="tmRoot"/>
-      </p:par>
-    </p:tnLst>
-  </p:timing>
 </p:sldLayout>
 </file>
 
@@ -1511,28 +1504,28 @@
                 <a:gridCol w="2764105">
                   <a:extLst>
                     <a:ext uri="{9D8B030D-6E8A-4147-A177-3AD203B41FA5}">
-                      <a16:colId xmlns="" xmlns:a16="http://schemas.microsoft.com/office/drawing/2014/main" val="20000"/>
+                      <a16:colId xmlns:a16="http://schemas.microsoft.com/office/drawing/2014/main" val="20000"/>
                     </a:ext>
                   </a:extLst>
                 </a:gridCol>
                 <a:gridCol w="2764105">
                   <a:extLst>
                     <a:ext uri="{9D8B030D-6E8A-4147-A177-3AD203B41FA5}">
-                      <a16:colId xmlns="" xmlns:a16="http://schemas.microsoft.com/office/drawing/2014/main" val="20001"/>
+                      <a16:colId xmlns:a16="http://schemas.microsoft.com/office/drawing/2014/main" val="20001"/>
                     </a:ext>
                   </a:extLst>
                 </a:gridCol>
                 <a:gridCol w="2764105">
                   <a:extLst>
                     <a:ext uri="{9D8B030D-6E8A-4147-A177-3AD203B41FA5}">
-                      <a16:colId xmlns="" xmlns:a16="http://schemas.microsoft.com/office/drawing/2014/main" val="20002"/>
+                      <a16:colId xmlns:a16="http://schemas.microsoft.com/office/drawing/2014/main" val="20002"/>
                     </a:ext>
                   </a:extLst>
                 </a:gridCol>
                 <a:gridCol w="2764105">
                   <a:extLst>
                     <a:ext uri="{9D8B030D-6E8A-4147-A177-3AD203B41FA5}">
-                      <a16:colId xmlns="" xmlns:a16="http://schemas.microsoft.com/office/drawing/2014/main" val="20003"/>
+                      <a16:colId xmlns:a16="http://schemas.microsoft.com/office/drawing/2014/main" val="20003"/>
                     </a:ext>
                   </a:extLst>
                 </a:gridCol>
@@ -1712,7 +1705,7 @@
                 </a:tc>
                 <a:extLst>
                   <a:ext uri="{0D108BD9-81ED-4DB2-BD59-A6C34878D82A}">
-                    <a16:rowId xmlns="" xmlns:a16="http://schemas.microsoft.com/office/drawing/2014/main" val="10000"/>
+                    <a16:rowId xmlns:a16="http://schemas.microsoft.com/office/drawing/2014/main" val="10000"/>
                   </a:ext>
                 </a:extLst>
               </a:tr>
@@ -1948,7 +1941,7 @@
                 </a:tc>
                 <a:extLst>
                   <a:ext uri="{0D108BD9-81ED-4DB2-BD59-A6C34878D82A}">
-                    <a16:rowId xmlns="" xmlns:a16="http://schemas.microsoft.com/office/drawing/2014/main" val="10001"/>
+                    <a16:rowId xmlns:a16="http://schemas.microsoft.com/office/drawing/2014/main" val="10001"/>
                   </a:ext>
                 </a:extLst>
               </a:tr>
@@ -2203,7 +2196,7 @@
                 </a:tc>
                 <a:extLst>
                   <a:ext uri="{0D108BD9-81ED-4DB2-BD59-A6C34878D82A}">
-                    <a16:rowId xmlns="" xmlns:a16="http://schemas.microsoft.com/office/drawing/2014/main" val="10002"/>
+                    <a16:rowId xmlns:a16="http://schemas.microsoft.com/office/drawing/2014/main" val="10002"/>
                   </a:ext>
                 </a:extLst>
               </a:tr>
@@ -2458,7 +2451,7 @@
                 </a:tc>
                 <a:extLst>
                   <a:ext uri="{0D108BD9-81ED-4DB2-BD59-A6C34878D82A}">
-                    <a16:rowId xmlns="" xmlns:a16="http://schemas.microsoft.com/office/drawing/2014/main" val="10003"/>
+                    <a16:rowId xmlns:a16="http://schemas.microsoft.com/office/drawing/2014/main" val="10003"/>
                   </a:ext>
                 </a:extLst>
               </a:tr>
@@ -2476,13 +2469,6 @@
   <p:clrMapOvr>
     <a:masterClrMapping/>
   </p:clrMapOvr>
-  <p:timing>
-    <p:tnLst>
-      <p:par>
-        <p:cTn id="1" dur="indefinite" restart="never" nodeType="tmRoot"/>
-      </p:par>
-    </p:tnLst>
-  </p:timing>
 </p:sldLayout>
 </file>
 
@@ -2544,13 +2530,6 @@
   <p:clrMapOvr>
     <a:masterClrMapping/>
   </p:clrMapOvr>
-  <p:timing>
-    <p:tnLst>
-      <p:par>
-        <p:cTn id="1" dur="indefinite" restart="never" nodeType="tmRoot"/>
-      </p:par>
-    </p:tnLst>
-  </p:timing>
 </p:sldLayout>
 </file>
 
@@ -2581,13 +2560,6 @@
   <p:clrMapOvr>
     <a:masterClrMapping/>
   </p:clrMapOvr>
-  <p:timing>
-    <p:tnLst>
-      <p:par>
-        <p:cTn id="1" dur="indefinite" restart="never" nodeType="tmRoot"/>
-      </p:par>
-    </p:tnLst>
-  </p:timing>
 </p:sldLayout>
 </file>
 
@@ -2845,13 +2817,6 @@
   <p:clrMapOvr>
     <a:masterClrMapping/>
   </p:clrMapOvr>
-  <p:timing>
-    <p:tnLst>
-      <p:par>
-        <p:cTn id="1" dur="indefinite" restart="never" nodeType="tmRoot"/>
-      </p:par>
-    </p:tnLst>
-  </p:timing>
 </p:sldLayout>
 </file>
 
@@ -3043,13 +3008,6 @@
       </p:transition>
     </mc:Fallback>
   </mc:AlternateContent>
-  <p:timing>
-    <p:tnLst>
-      <p:par>
-        <p:cTn id="1" dur="indefinite" restart="never" nodeType="tmRoot"/>
-      </p:par>
-    </p:tnLst>
-  </p:timing>
 </p:sldLayout>
 </file>
 
@@ -3275,13 +3233,6 @@
   <p:transition>
     <p:fade/>
   </p:transition>
-  <p:timing>
-    <p:tnLst>
-      <p:par>
-        <p:cTn id="1" dur="indefinite" restart="never" nodeType="tmRoot"/>
-      </p:par>
-    </p:tnLst>
-  </p:timing>
 </p:sldLayout>
 </file>
 
@@ -3507,13 +3458,6 @@
   <p:transition>
     <p:fade/>
   </p:transition>
-  <p:timing>
-    <p:tnLst>
-      <p:par>
-        <p:cTn id="1" dur="indefinite" restart="never" nodeType="tmRoot"/>
-      </p:par>
-    </p:tnLst>
-  </p:timing>
 </p:sldLayout>
 </file>
 
@@ -3739,13 +3683,6 @@
   <p:transition>
     <p:fade/>
   </p:transition>
-  <p:timing>
-    <p:tnLst>
-      <p:par>
-        <p:cTn id="1" dur="indefinite" restart="never" nodeType="tmRoot"/>
-      </p:par>
-    </p:tnLst>
-  </p:timing>
 </p:sldLayout>
 </file>
 
@@ -3971,13 +3908,6 @@
   <p:transition>
     <p:fade/>
   </p:transition>
-  <p:timing>
-    <p:tnLst>
-      <p:par>
-        <p:cTn id="1" dur="indefinite" restart="never" nodeType="tmRoot"/>
-      </p:par>
-    </p:tnLst>
-  </p:timing>
 </p:sldLayout>
 </file>
 
@@ -4589,13 +4519,6 @@
   <p:transition>
     <p:fade/>
   </p:transition>
-  <p:timing>
-    <p:tnLst>
-      <p:par>
-        <p:cTn id="1" dur="indefinite" restart="never" nodeType="tmRoot"/>
-      </p:par>
-    </p:tnLst>
-  </p:timing>
 </p:sldLayout>
 </file>
 
@@ -4700,13 +4623,6 @@
   <p:clrMapOvr>
     <a:masterClrMapping/>
   </p:clrMapOvr>
-  <p:timing>
-    <p:tnLst>
-      <p:par>
-        <p:cTn id="1" dur="indefinite" restart="never" nodeType="tmRoot"/>
-      </p:par>
-    </p:tnLst>
-  </p:timing>
 </p:sldLayout>
 </file>
 
@@ -4932,13 +4848,6 @@
   <p:transition>
     <p:fade/>
   </p:transition>
-  <p:timing>
-    <p:tnLst>
-      <p:par>
-        <p:cTn id="1" dur="indefinite" restart="never" nodeType="tmRoot"/>
-      </p:par>
-    </p:tnLst>
-  </p:timing>
 </p:sldLayout>
 </file>
 
@@ -5086,13 +4995,6 @@
   <p:transition>
     <p:fade/>
   </p:transition>
-  <p:timing>
-    <p:tnLst>
-      <p:par>
-        <p:cTn id="1" dur="indefinite" restart="never" nodeType="tmRoot"/>
-      </p:par>
-    </p:tnLst>
-  </p:timing>
 </p:sldLayout>
 </file>
 
@@ -5227,13 +5129,6 @@
   <p:transition>
     <p:fade/>
   </p:transition>
-  <p:timing>
-    <p:tnLst>
-      <p:par>
-        <p:cTn id="1" dur="indefinite" restart="never" nodeType="tmRoot"/>
-      </p:par>
-    </p:tnLst>
-  </p:timing>
 </p:sldLayout>
 </file>
 
@@ -5371,13 +5266,6 @@
   <p:clrMapOvr>
     <a:masterClrMapping/>
   </p:clrMapOvr>
-  <p:timing>
-    <p:tnLst>
-      <p:par>
-        <p:cTn id="1" dur="indefinite" restart="never" nodeType="tmRoot"/>
-      </p:par>
-    </p:tnLst>
-  </p:timing>
 </p:sldLayout>
 </file>
 
@@ -5522,13 +5410,6 @@
   <p:clrMapOvr>
     <a:masterClrMapping/>
   </p:clrMapOvr>
-  <p:timing>
-    <p:tnLst>
-      <p:par>
-        <p:cTn id="1" dur="indefinite" restart="never" nodeType="tmRoot"/>
-      </p:par>
-    </p:tnLst>
-  </p:timing>
 </p:sldLayout>
 </file>
 
@@ -5710,13 +5591,6 @@
   <p:clrMapOvr>
     <a:masterClrMapping/>
   </p:clrMapOvr>
-  <p:timing>
-    <p:tnLst>
-      <p:par>
-        <p:cTn id="1" dur="indefinite" restart="never" nodeType="tmRoot"/>
-      </p:par>
-    </p:tnLst>
-  </p:timing>
 </p:sldLayout>
 </file>
 
@@ -5809,13 +5683,6 @@
   <p:clrMapOvr>
     <a:masterClrMapping/>
   </p:clrMapOvr>
-  <p:timing>
-    <p:tnLst>
-      <p:par>
-        <p:cTn id="1" dur="indefinite" restart="never" nodeType="tmRoot"/>
-      </p:par>
-    </p:tnLst>
-  </p:timing>
 </p:sldLayout>
 </file>
 
@@ -5929,28 +5796,28 @@
                 <a:gridCol w="2764105">
                   <a:extLst>
                     <a:ext uri="{9D8B030D-6E8A-4147-A177-3AD203B41FA5}">
-                      <a16:colId xmlns="" xmlns:a16="http://schemas.microsoft.com/office/drawing/2014/main" val="20000"/>
+                      <a16:colId xmlns:a16="http://schemas.microsoft.com/office/drawing/2014/main" val="20000"/>
                     </a:ext>
                   </a:extLst>
                 </a:gridCol>
                 <a:gridCol w="2764105">
                   <a:extLst>
                     <a:ext uri="{9D8B030D-6E8A-4147-A177-3AD203B41FA5}">
-                      <a16:colId xmlns="" xmlns:a16="http://schemas.microsoft.com/office/drawing/2014/main" val="20001"/>
+                      <a16:colId xmlns:a16="http://schemas.microsoft.com/office/drawing/2014/main" val="20001"/>
                     </a:ext>
                   </a:extLst>
                 </a:gridCol>
                 <a:gridCol w="2764105">
                   <a:extLst>
                     <a:ext uri="{9D8B030D-6E8A-4147-A177-3AD203B41FA5}">
-                      <a16:colId xmlns="" xmlns:a16="http://schemas.microsoft.com/office/drawing/2014/main" val="20002"/>
+                      <a16:colId xmlns:a16="http://schemas.microsoft.com/office/drawing/2014/main" val="20002"/>
                     </a:ext>
                   </a:extLst>
                 </a:gridCol>
                 <a:gridCol w="2764105">
                   <a:extLst>
                     <a:ext uri="{9D8B030D-6E8A-4147-A177-3AD203B41FA5}">
-                      <a16:colId xmlns="" xmlns:a16="http://schemas.microsoft.com/office/drawing/2014/main" val="20003"/>
+                      <a16:colId xmlns:a16="http://schemas.microsoft.com/office/drawing/2014/main" val="20003"/>
                     </a:ext>
                   </a:extLst>
                 </a:gridCol>
@@ -6114,7 +5981,7 @@
                 </a:tc>
                 <a:extLst>
                   <a:ext uri="{0D108BD9-81ED-4DB2-BD59-A6C34878D82A}">
-                    <a16:rowId xmlns="" xmlns:a16="http://schemas.microsoft.com/office/drawing/2014/main" val="10000"/>
+                    <a16:rowId xmlns:a16="http://schemas.microsoft.com/office/drawing/2014/main" val="10000"/>
                   </a:ext>
                 </a:extLst>
               </a:tr>
@@ -6334,7 +6201,7 @@
                 </a:tc>
                 <a:extLst>
                   <a:ext uri="{0D108BD9-81ED-4DB2-BD59-A6C34878D82A}">
-                    <a16:rowId xmlns="" xmlns:a16="http://schemas.microsoft.com/office/drawing/2014/main" val="10001"/>
+                    <a16:rowId xmlns:a16="http://schemas.microsoft.com/office/drawing/2014/main" val="10001"/>
                   </a:ext>
                 </a:extLst>
               </a:tr>
@@ -6573,7 +6440,7 @@
                 </a:tc>
                 <a:extLst>
                   <a:ext uri="{0D108BD9-81ED-4DB2-BD59-A6C34878D82A}">
-                    <a16:rowId xmlns="" xmlns:a16="http://schemas.microsoft.com/office/drawing/2014/main" val="10002"/>
+                    <a16:rowId xmlns:a16="http://schemas.microsoft.com/office/drawing/2014/main" val="10002"/>
                   </a:ext>
                 </a:extLst>
               </a:tr>
@@ -6812,7 +6679,7 @@
                 </a:tc>
                 <a:extLst>
                   <a:ext uri="{0D108BD9-81ED-4DB2-BD59-A6C34878D82A}">
-                    <a16:rowId xmlns="" xmlns:a16="http://schemas.microsoft.com/office/drawing/2014/main" val="10003"/>
+                    <a16:rowId xmlns:a16="http://schemas.microsoft.com/office/drawing/2014/main" val="10003"/>
                   </a:ext>
                 </a:extLst>
               </a:tr>
@@ -6830,13 +6697,6 @@
   <p:clrMapOvr>
     <a:masterClrMapping/>
   </p:clrMapOvr>
-  <p:timing>
-    <p:tnLst>
-      <p:par>
-        <p:cTn id="1" dur="indefinite" restart="never" nodeType="tmRoot"/>
-      </p:par>
-    </p:tnLst>
-  </p:timing>
 </p:sldLayout>
 </file>
 
@@ -6906,13 +6766,6 @@
   <p:clrMapOvr>
     <a:masterClrMapping/>
   </p:clrMapOvr>
-  <p:timing>
-    <p:tnLst>
-      <p:par>
-        <p:cTn id="1" dur="indefinite" restart="never" nodeType="tmRoot"/>
-      </p:par>
-    </p:tnLst>
-  </p:timing>
 </p:sldLayout>
 </file>
 
@@ -6951,13 +6804,6 @@
   <p:clrMapOvr>
     <a:masterClrMapping/>
   </p:clrMapOvr>
-  <p:timing>
-    <p:tnLst>
-      <p:par>
-        <p:cTn id="1" dur="indefinite" restart="never" nodeType="tmRoot"/>
-      </p:par>
-    </p:tnLst>
-  </p:timing>
 </p:sldLayout>
 </file>
 
@@ -7062,13 +6908,6 @@
   <p:clrMapOvr>
     <a:masterClrMapping/>
   </p:clrMapOvr>
-  <p:timing>
-    <p:tnLst>
-      <p:par>
-        <p:cTn id="1" dur="indefinite" restart="never" nodeType="tmRoot"/>
-      </p:par>
-    </p:tnLst>
-  </p:timing>
 </p:sldLayout>
 </file>
 
@@ -7334,13 +7173,6 @@
   <p:clrMapOvr>
     <a:masterClrMapping/>
   </p:clrMapOvr>
-  <p:timing>
-    <p:tnLst>
-      <p:par>
-        <p:cTn id="1" dur="indefinite" restart="never" nodeType="tmRoot"/>
-      </p:par>
-    </p:tnLst>
-  </p:timing>
 </p:sldLayout>
 </file>
 
@@ -7478,13 +7310,6 @@
   <p:clrMapOvr>
     <a:masterClrMapping/>
   </p:clrMapOvr>
-  <p:timing>
-    <p:tnLst>
-      <p:par>
-        <p:cTn id="1" dur="indefinite" restart="never" nodeType="tmRoot"/>
-      </p:par>
-    </p:tnLst>
-  </p:timing>
 </p:sldLayout>
 </file>
 
@@ -7629,13 +7454,6 @@
   <p:clrMapOvr>
     <a:masterClrMapping/>
   </p:clrMapOvr>
-  <p:timing>
-    <p:tnLst>
-      <p:par>
-        <p:cTn id="1" dur="indefinite" restart="never" nodeType="tmRoot"/>
-      </p:par>
-    </p:tnLst>
-  </p:timing>
 </p:sldLayout>
 </file>
 
@@ -7817,13 +7635,6 @@
   <p:clrMapOvr>
     <a:masterClrMapping/>
   </p:clrMapOvr>
-  <p:timing>
-    <p:tnLst>
-      <p:par>
-        <p:cTn id="1" dur="indefinite" restart="never" nodeType="tmRoot"/>
-      </p:par>
-    </p:tnLst>
-  </p:timing>
 </p:sldLayout>
 </file>
 
@@ -7916,13 +7727,6 @@
   <p:clrMapOvr>
     <a:masterClrMapping/>
   </p:clrMapOvr>
-  <p:timing>
-    <p:tnLst>
-      <p:par>
-        <p:cTn id="1" dur="indefinite" restart="never" nodeType="tmRoot"/>
-      </p:par>
-    </p:tnLst>
-  </p:timing>
 </p:sldLayout>
 </file>
 
@@ -8036,28 +7840,28 @@
                 <a:gridCol w="2764105">
                   <a:extLst>
                     <a:ext uri="{9D8B030D-6E8A-4147-A177-3AD203B41FA5}">
-                      <a16:colId xmlns="" xmlns:a16="http://schemas.microsoft.com/office/drawing/2014/main" val="20000"/>
+                      <a16:colId xmlns:a16="http://schemas.microsoft.com/office/drawing/2014/main" val="20000"/>
                     </a:ext>
                   </a:extLst>
                 </a:gridCol>
                 <a:gridCol w="2764105">
                   <a:extLst>
                     <a:ext uri="{9D8B030D-6E8A-4147-A177-3AD203B41FA5}">
-                      <a16:colId xmlns="" xmlns:a16="http://schemas.microsoft.com/office/drawing/2014/main" val="20001"/>
+                      <a16:colId xmlns:a16="http://schemas.microsoft.com/office/drawing/2014/main" val="20001"/>
                     </a:ext>
                   </a:extLst>
                 </a:gridCol>
                 <a:gridCol w="2764105">
                   <a:extLst>
                     <a:ext uri="{9D8B030D-6E8A-4147-A177-3AD203B41FA5}">
-                      <a16:colId xmlns="" xmlns:a16="http://schemas.microsoft.com/office/drawing/2014/main" val="20002"/>
+                      <a16:colId xmlns:a16="http://schemas.microsoft.com/office/drawing/2014/main" val="20002"/>
                     </a:ext>
                   </a:extLst>
                 </a:gridCol>
                 <a:gridCol w="2764105">
                   <a:extLst>
                     <a:ext uri="{9D8B030D-6E8A-4147-A177-3AD203B41FA5}">
-                      <a16:colId xmlns="" xmlns:a16="http://schemas.microsoft.com/office/drawing/2014/main" val="20003"/>
+                      <a16:colId xmlns:a16="http://schemas.microsoft.com/office/drawing/2014/main" val="20003"/>
                     </a:ext>
                   </a:extLst>
                 </a:gridCol>
@@ -8233,7 +8037,7 @@
                 </a:tc>
                 <a:extLst>
                   <a:ext uri="{0D108BD9-81ED-4DB2-BD59-A6C34878D82A}">
-                    <a16:rowId xmlns="" xmlns:a16="http://schemas.microsoft.com/office/drawing/2014/main" val="10000"/>
+                    <a16:rowId xmlns:a16="http://schemas.microsoft.com/office/drawing/2014/main" val="10000"/>
                   </a:ext>
                 </a:extLst>
               </a:tr>
@@ -8465,7 +8269,7 @@
                 </a:tc>
                 <a:extLst>
                   <a:ext uri="{0D108BD9-81ED-4DB2-BD59-A6C34878D82A}">
-                    <a16:rowId xmlns="" xmlns:a16="http://schemas.microsoft.com/office/drawing/2014/main" val="10001"/>
+                    <a16:rowId xmlns:a16="http://schemas.microsoft.com/office/drawing/2014/main" val="10001"/>
                   </a:ext>
                 </a:extLst>
               </a:tr>
@@ -8724,7 +8528,7 @@
                 </a:tc>
                 <a:extLst>
                   <a:ext uri="{0D108BD9-81ED-4DB2-BD59-A6C34878D82A}">
-                    <a16:rowId xmlns="" xmlns:a16="http://schemas.microsoft.com/office/drawing/2014/main" val="10002"/>
+                    <a16:rowId xmlns:a16="http://schemas.microsoft.com/office/drawing/2014/main" val="10002"/>
                   </a:ext>
                 </a:extLst>
               </a:tr>
@@ -8975,7 +8779,7 @@
                 </a:tc>
                 <a:extLst>
                   <a:ext uri="{0D108BD9-81ED-4DB2-BD59-A6C34878D82A}">
-                    <a16:rowId xmlns="" xmlns:a16="http://schemas.microsoft.com/office/drawing/2014/main" val="10003"/>
+                    <a16:rowId xmlns:a16="http://schemas.microsoft.com/office/drawing/2014/main" val="10003"/>
                   </a:ext>
                 </a:extLst>
               </a:tr>
@@ -8993,13 +8797,6 @@
   <p:clrMapOvr>
     <a:masterClrMapping/>
   </p:clrMapOvr>
-  <p:timing>
-    <p:tnLst>
-      <p:par>
-        <p:cTn id="1" dur="indefinite" restart="never" nodeType="tmRoot"/>
-      </p:par>
-    </p:tnLst>
-  </p:timing>
 </p:sldLayout>
 </file>
 
@@ -9069,13 +8866,6 @@
   <p:clrMapOvr>
     <a:masterClrMapping/>
   </p:clrMapOvr>
-  <p:timing>
-    <p:tnLst>
-      <p:par>
-        <p:cTn id="1" dur="indefinite" restart="never" nodeType="tmRoot"/>
-      </p:par>
-    </p:tnLst>
-  </p:timing>
 </p:sldLayout>
 </file>
 
@@ -9114,13 +8904,6 @@
   <p:clrMapOvr>
     <a:masterClrMapping/>
   </p:clrMapOvr>
-  <p:timing>
-    <p:tnLst>
-      <p:par>
-        <p:cTn id="1" dur="indefinite" restart="never" nodeType="tmRoot"/>
-      </p:par>
-    </p:tnLst>
-  </p:timing>
 </p:sldLayout>
 </file>
 
@@ -9386,13 +9169,6 @@
   <p:clrMapOvr>
     <a:masterClrMapping/>
   </p:clrMapOvr>
-  <p:timing>
-    <p:tnLst>
-      <p:par>
-        <p:cTn id="1" dur="indefinite" restart="never" nodeType="tmRoot"/>
-      </p:par>
-    </p:tnLst>
-  </p:timing>
 </p:sldLayout>
 </file>
 
@@ -9530,13 +9306,6 @@
   <p:clrMapOvr>
     <a:masterClrMapping/>
   </p:clrMapOvr>
-  <p:timing>
-    <p:tnLst>
-      <p:par>
-        <p:cTn id="1" dur="indefinite" restart="never" nodeType="tmRoot"/>
-      </p:par>
-    </p:tnLst>
-  </p:timing>
 </p:sldLayout>
 </file>
 
@@ -9641,13 +9410,6 @@
   <p:clrMapOvr>
     <a:masterClrMapping/>
   </p:clrMapOvr>
-  <p:timing>
-    <p:tnLst>
-      <p:par>
-        <p:cTn id="1" dur="indefinite" restart="never" nodeType="tmRoot"/>
-      </p:par>
-    </p:tnLst>
-  </p:timing>
 </p:sldLayout>
 </file>
 
@@ -9792,13 +9554,6 @@
   <p:clrMapOvr>
     <a:masterClrMapping/>
   </p:clrMapOvr>
-  <p:timing>
-    <p:tnLst>
-      <p:par>
-        <p:cTn id="1" dur="indefinite" restart="never" nodeType="tmRoot"/>
-      </p:par>
-    </p:tnLst>
-  </p:timing>
 </p:sldLayout>
 </file>
 
@@ -9980,13 +9735,6 @@
   <p:clrMapOvr>
     <a:masterClrMapping/>
   </p:clrMapOvr>
-  <p:timing>
-    <p:tnLst>
-      <p:par>
-        <p:cTn id="1" dur="indefinite" restart="never" nodeType="tmRoot"/>
-      </p:par>
-    </p:tnLst>
-  </p:timing>
 </p:sldLayout>
 </file>
 
@@ -10079,13 +9827,6 @@
   <p:clrMapOvr>
     <a:masterClrMapping/>
   </p:clrMapOvr>
-  <p:timing>
-    <p:tnLst>
-      <p:par>
-        <p:cTn id="1" dur="indefinite" restart="never" nodeType="tmRoot"/>
-      </p:par>
-    </p:tnLst>
-  </p:timing>
 </p:sldLayout>
 </file>
 
@@ -10193,28 +9934,28 @@
                 <a:gridCol w="2764105">
                   <a:extLst>
                     <a:ext uri="{9D8B030D-6E8A-4147-A177-3AD203B41FA5}">
-                      <a16:colId xmlns="" xmlns:a16="http://schemas.microsoft.com/office/drawing/2014/main" val="20000"/>
+                      <a16:colId xmlns:a16="http://schemas.microsoft.com/office/drawing/2014/main" val="20000"/>
                     </a:ext>
                   </a:extLst>
                 </a:gridCol>
                 <a:gridCol w="2764105">
                   <a:extLst>
                     <a:ext uri="{9D8B030D-6E8A-4147-A177-3AD203B41FA5}">
-                      <a16:colId xmlns="" xmlns:a16="http://schemas.microsoft.com/office/drawing/2014/main" val="20001"/>
+                      <a16:colId xmlns:a16="http://schemas.microsoft.com/office/drawing/2014/main" val="20001"/>
                     </a:ext>
                   </a:extLst>
                 </a:gridCol>
                 <a:gridCol w="2764105">
                   <a:extLst>
                     <a:ext uri="{9D8B030D-6E8A-4147-A177-3AD203B41FA5}">
-                      <a16:colId xmlns="" xmlns:a16="http://schemas.microsoft.com/office/drawing/2014/main" val="20002"/>
+                      <a16:colId xmlns:a16="http://schemas.microsoft.com/office/drawing/2014/main" val="20002"/>
                     </a:ext>
                   </a:extLst>
                 </a:gridCol>
                 <a:gridCol w="2764105">
                   <a:extLst>
                     <a:ext uri="{9D8B030D-6E8A-4147-A177-3AD203B41FA5}">
-                      <a16:colId xmlns="" xmlns:a16="http://schemas.microsoft.com/office/drawing/2014/main" val="20003"/>
+                      <a16:colId xmlns:a16="http://schemas.microsoft.com/office/drawing/2014/main" val="20003"/>
                     </a:ext>
                   </a:extLst>
                 </a:gridCol>
@@ -10394,7 +10135,7 @@
                 </a:tc>
                 <a:extLst>
                   <a:ext uri="{0D108BD9-81ED-4DB2-BD59-A6C34878D82A}">
-                    <a16:rowId xmlns="" xmlns:a16="http://schemas.microsoft.com/office/drawing/2014/main" val="10000"/>
+                    <a16:rowId xmlns:a16="http://schemas.microsoft.com/office/drawing/2014/main" val="10000"/>
                   </a:ext>
                 </a:extLst>
               </a:tr>
@@ -10630,7 +10371,7 @@
                 </a:tc>
                 <a:extLst>
                   <a:ext uri="{0D108BD9-81ED-4DB2-BD59-A6C34878D82A}">
-                    <a16:rowId xmlns="" xmlns:a16="http://schemas.microsoft.com/office/drawing/2014/main" val="10001"/>
+                    <a16:rowId xmlns:a16="http://schemas.microsoft.com/office/drawing/2014/main" val="10001"/>
                   </a:ext>
                 </a:extLst>
               </a:tr>
@@ -10885,7 +10626,7 @@
                 </a:tc>
                 <a:extLst>
                   <a:ext uri="{0D108BD9-81ED-4DB2-BD59-A6C34878D82A}">
-                    <a16:rowId xmlns="" xmlns:a16="http://schemas.microsoft.com/office/drawing/2014/main" val="10002"/>
+                    <a16:rowId xmlns:a16="http://schemas.microsoft.com/office/drawing/2014/main" val="10002"/>
                   </a:ext>
                 </a:extLst>
               </a:tr>
@@ -11140,7 +10881,7 @@
                 </a:tc>
                 <a:extLst>
                   <a:ext uri="{0D108BD9-81ED-4DB2-BD59-A6C34878D82A}">
-                    <a16:rowId xmlns="" xmlns:a16="http://schemas.microsoft.com/office/drawing/2014/main" val="10003"/>
+                    <a16:rowId xmlns:a16="http://schemas.microsoft.com/office/drawing/2014/main" val="10003"/>
                   </a:ext>
                 </a:extLst>
               </a:tr>
@@ -11158,13 +10899,6 @@
   <p:clrMapOvr>
     <a:masterClrMapping/>
   </p:clrMapOvr>
-  <p:timing>
-    <p:tnLst>
-      <p:par>
-        <p:cTn id="1" dur="indefinite" restart="never" nodeType="tmRoot"/>
-      </p:par>
-    </p:tnLst>
-  </p:timing>
 </p:sldLayout>
 </file>
 
@@ -11234,13 +10968,6 @@
   <p:clrMapOvr>
     <a:masterClrMapping/>
   </p:clrMapOvr>
-  <p:timing>
-    <p:tnLst>
-      <p:par>
-        <p:cTn id="1" dur="indefinite" restart="never" nodeType="tmRoot"/>
-      </p:par>
-    </p:tnLst>
-  </p:timing>
 </p:sldLayout>
 </file>
 
@@ -11279,13 +11006,6 @@
   <p:clrMapOvr>
     <a:masterClrMapping/>
   </p:clrMapOvr>
-  <p:timing>
-    <p:tnLst>
-      <p:par>
-        <p:cTn id="1" dur="indefinite" restart="never" nodeType="tmRoot"/>
-      </p:par>
-    </p:tnLst>
-  </p:timing>
 </p:sldLayout>
 </file>
 
@@ -11551,13 +11271,6 @@
   <p:clrMapOvr>
     <a:masterClrMapping/>
   </p:clrMapOvr>
-  <p:timing>
-    <p:tnLst>
-      <p:par>
-        <p:cTn id="1" dur="indefinite" restart="never" nodeType="tmRoot"/>
-      </p:par>
-    </p:tnLst>
-  </p:timing>
 </p:sldLayout>
 </file>
 
@@ -11737,13 +11450,6 @@
   <p:clrMapOvr>
     <a:masterClrMapping/>
   </p:clrMapOvr>
-  <p:timing>
-    <p:tnLst>
-      <p:par>
-        <p:cTn id="1" dur="indefinite" restart="never" nodeType="tmRoot"/>
-      </p:par>
-    </p:tnLst>
-  </p:timing>
 </p:sldLayout>
 </file>
 
@@ -11888,13 +11594,6 @@
   <p:clrMapOvr>
     <a:masterClrMapping/>
   </p:clrMapOvr>
-  <p:timing>
-    <p:tnLst>
-      <p:par>
-        <p:cTn id="1" dur="indefinite" restart="never" nodeType="tmRoot"/>
-      </p:par>
-    </p:tnLst>
-  </p:timing>
 </p:sldLayout>
 </file>
 
@@ -12007,13 +11706,6 @@
   <p:clrMapOvr>
     <a:masterClrMapping/>
   </p:clrMapOvr>
-  <p:timing>
-    <p:tnLst>
-      <p:par>
-        <p:cTn id="1" dur="indefinite" restart="never" nodeType="tmRoot"/>
-      </p:par>
-    </p:tnLst>
-  </p:timing>
 </p:sldLayout>
 </file>
 
@@ -12195,13 +11887,6 @@
   <p:clrMapOvr>
     <a:masterClrMapping/>
   </p:clrMapOvr>
-  <p:timing>
-    <p:tnLst>
-      <p:par>
-        <p:cTn id="1" dur="indefinite" restart="never" nodeType="tmRoot"/>
-      </p:par>
-    </p:tnLst>
-  </p:timing>
 </p:sldLayout>
 </file>
 
@@ -12294,13 +11979,6 @@
   <p:clrMapOvr>
     <a:masterClrMapping/>
   </p:clrMapOvr>
-  <p:timing>
-    <p:tnLst>
-      <p:par>
-        <p:cTn id="1" dur="indefinite" restart="never" nodeType="tmRoot"/>
-      </p:par>
-    </p:tnLst>
-  </p:timing>
 </p:sldLayout>
 </file>
 
@@ -12408,28 +12086,28 @@
                 <a:gridCol w="2764105">
                   <a:extLst>
                     <a:ext uri="{9D8B030D-6E8A-4147-A177-3AD203B41FA5}">
-                      <a16:colId xmlns="" xmlns:a16="http://schemas.microsoft.com/office/drawing/2014/main" val="20000"/>
+                      <a16:colId xmlns:a16="http://schemas.microsoft.com/office/drawing/2014/main" val="20000"/>
                     </a:ext>
                   </a:extLst>
                 </a:gridCol>
                 <a:gridCol w="2764105">
                   <a:extLst>
                     <a:ext uri="{9D8B030D-6E8A-4147-A177-3AD203B41FA5}">
-                      <a16:colId xmlns="" xmlns:a16="http://schemas.microsoft.com/office/drawing/2014/main" val="20001"/>
+                      <a16:colId xmlns:a16="http://schemas.microsoft.com/office/drawing/2014/main" val="20001"/>
                     </a:ext>
                   </a:extLst>
                 </a:gridCol>
                 <a:gridCol w="2764105">
                   <a:extLst>
                     <a:ext uri="{9D8B030D-6E8A-4147-A177-3AD203B41FA5}">
-                      <a16:colId xmlns="" xmlns:a16="http://schemas.microsoft.com/office/drawing/2014/main" val="20002"/>
+                      <a16:colId xmlns:a16="http://schemas.microsoft.com/office/drawing/2014/main" val="20002"/>
                     </a:ext>
                   </a:extLst>
                 </a:gridCol>
                 <a:gridCol w="2764105">
                   <a:extLst>
                     <a:ext uri="{9D8B030D-6E8A-4147-A177-3AD203B41FA5}">
-                      <a16:colId xmlns="" xmlns:a16="http://schemas.microsoft.com/office/drawing/2014/main" val="20003"/>
+                      <a16:colId xmlns:a16="http://schemas.microsoft.com/office/drawing/2014/main" val="20003"/>
                     </a:ext>
                   </a:extLst>
                 </a:gridCol>
@@ -12609,7 +12287,7 @@
                 </a:tc>
                 <a:extLst>
                   <a:ext uri="{0D108BD9-81ED-4DB2-BD59-A6C34878D82A}">
-                    <a16:rowId xmlns="" xmlns:a16="http://schemas.microsoft.com/office/drawing/2014/main" val="10000"/>
+                    <a16:rowId xmlns:a16="http://schemas.microsoft.com/office/drawing/2014/main" val="10000"/>
                   </a:ext>
                 </a:extLst>
               </a:tr>
@@ -12845,7 +12523,7 @@
                 </a:tc>
                 <a:extLst>
                   <a:ext uri="{0D108BD9-81ED-4DB2-BD59-A6C34878D82A}">
-                    <a16:rowId xmlns="" xmlns:a16="http://schemas.microsoft.com/office/drawing/2014/main" val="10001"/>
+                    <a16:rowId xmlns:a16="http://schemas.microsoft.com/office/drawing/2014/main" val="10001"/>
                   </a:ext>
                 </a:extLst>
               </a:tr>
@@ -13100,7 +12778,7 @@
                 </a:tc>
                 <a:extLst>
                   <a:ext uri="{0D108BD9-81ED-4DB2-BD59-A6C34878D82A}">
-                    <a16:rowId xmlns="" xmlns:a16="http://schemas.microsoft.com/office/drawing/2014/main" val="10002"/>
+                    <a16:rowId xmlns:a16="http://schemas.microsoft.com/office/drawing/2014/main" val="10002"/>
                   </a:ext>
                 </a:extLst>
               </a:tr>
@@ -13355,7 +13033,7 @@
                 </a:tc>
                 <a:extLst>
                   <a:ext uri="{0D108BD9-81ED-4DB2-BD59-A6C34878D82A}">
-                    <a16:rowId xmlns="" xmlns:a16="http://schemas.microsoft.com/office/drawing/2014/main" val="10003"/>
+                    <a16:rowId xmlns:a16="http://schemas.microsoft.com/office/drawing/2014/main" val="10003"/>
                   </a:ext>
                 </a:extLst>
               </a:tr>
@@ -13373,13 +13051,6 @@
   <p:clrMapOvr>
     <a:masterClrMapping/>
   </p:clrMapOvr>
-  <p:timing>
-    <p:tnLst>
-      <p:par>
-        <p:cTn id="1" dur="indefinite" restart="never" nodeType="tmRoot"/>
-      </p:par>
-    </p:tnLst>
-  </p:timing>
 </p:sldLayout>
 </file>
 
@@ -13449,13 +13120,6 @@
   <p:clrMapOvr>
     <a:masterClrMapping/>
   </p:clrMapOvr>
-  <p:timing>
-    <p:tnLst>
-      <p:par>
-        <p:cTn id="1" dur="indefinite" restart="never" nodeType="tmRoot"/>
-      </p:par>
-    </p:tnLst>
-  </p:timing>
 </p:sldLayout>
 </file>
 
@@ -13494,13 +13158,6 @@
   <p:clrMapOvr>
     <a:masterClrMapping/>
   </p:clrMapOvr>
-  <p:timing>
-    <p:tnLst>
-      <p:par>
-        <p:cTn id="1" dur="indefinite" restart="never" nodeType="tmRoot"/>
-      </p:par>
-    </p:tnLst>
-  </p:timing>
 </p:sldLayout>
 </file>
 
@@ -13766,13 +13423,6 @@
   <p:clrMapOvr>
     <a:masterClrMapping/>
   </p:clrMapOvr>
-  <p:timing>
-    <p:tnLst>
-      <p:par>
-        <p:cTn id="1" dur="indefinite" restart="never" nodeType="tmRoot"/>
-      </p:par>
-    </p:tnLst>
-  </p:timing>
 </p:sldLayout>
 </file>
 
@@ -13910,13 +13560,6 @@
   <p:clrMapOvr>
     <a:masterClrMapping/>
   </p:clrMapOvr>
-  <p:timing>
-    <p:tnLst>
-      <p:par>
-        <p:cTn id="1" dur="indefinite" restart="never" nodeType="tmRoot"/>
-      </p:par>
-    </p:tnLst>
-  </p:timing>
 </p:sldLayout>
 </file>
 
@@ -14061,13 +13704,6 @@
   <p:clrMapOvr>
     <a:masterClrMapping/>
   </p:clrMapOvr>
-  <p:timing>
-    <p:tnLst>
-      <p:par>
-        <p:cTn id="1" dur="indefinite" restart="never" nodeType="tmRoot"/>
-      </p:par>
-    </p:tnLst>
-  </p:timing>
 </p:sldLayout>
 </file>
 
@@ -14249,13 +13885,6 @@
   <p:clrMapOvr>
     <a:masterClrMapping/>
   </p:clrMapOvr>
-  <p:timing>
-    <p:tnLst>
-      <p:par>
-        <p:cTn id="1" dur="indefinite" restart="never" nodeType="tmRoot"/>
-      </p:par>
-    </p:tnLst>
-  </p:timing>
 </p:sldLayout>
 </file>
 
@@ -14348,13 +13977,6 @@
   <p:clrMapOvr>
     <a:masterClrMapping/>
   </p:clrMapOvr>
-  <p:timing>
-    <p:tnLst>
-      <p:par>
-        <p:cTn id="1" dur="indefinite" restart="never" nodeType="tmRoot"/>
-      </p:par>
-    </p:tnLst>
-  </p:timing>
 </p:sldLayout>
 </file>
 
@@ -14484,13 +14106,6 @@
   <p:clrMapOvr>
     <a:masterClrMapping/>
   </p:clrMapOvr>
-  <p:timing>
-    <p:tnLst>
-      <p:par>
-        <p:cTn id="1" dur="indefinite" restart="never" nodeType="tmRoot"/>
-      </p:par>
-    </p:tnLst>
-  </p:timing>
 </p:sldLayout>
 </file>
 
@@ -14560,13 +14175,6 @@
   <p:clrMapOvr>
     <a:masterClrMapping/>
   </p:clrMapOvr>
-  <p:timing>
-    <p:tnLst>
-      <p:par>
-        <p:cTn id="1" dur="indefinite" restart="never" nodeType="tmRoot"/>
-      </p:par>
-    </p:tnLst>
-  </p:timing>
 </p:sldLayout>
 </file>
 
@@ -14605,13 +14213,6 @@
   <p:clrMapOvr>
     <a:masterClrMapping/>
   </p:clrMapOvr>
-  <p:timing>
-    <p:tnLst>
-      <p:par>
-        <p:cTn id="1" dur="indefinite" restart="never" nodeType="tmRoot"/>
-      </p:par>
-    </p:tnLst>
-  </p:timing>
 </p:sldLayout>
 </file>
 
@@ -14877,13 +14478,6 @@
   <p:clrMapOvr>
     <a:masterClrMapping/>
   </p:clrMapOvr>
-  <p:timing>
-    <p:tnLst>
-      <p:par>
-        <p:cTn id="1" dur="indefinite" restart="never" nodeType="tmRoot"/>
-      </p:par>
-    </p:tnLst>
-  </p:timing>
 </p:sldLayout>
 </file>
 
@@ -15020,13 +14614,6 @@
   <p:clrMapOvr>
     <a:masterClrMapping/>
   </p:clrMapOvr>
-  <p:timing>
-    <p:tnLst>
-      <p:par>
-        <p:cTn id="1" dur="indefinite" restart="never" nodeType="tmRoot"/>
-      </p:par>
-    </p:tnLst>
-  </p:timing>
 </p:sldLayout>
 </file>
 
@@ -15208,13 +14795,6 @@
   <p:clrMapOvr>
     <a:masterClrMapping/>
   </p:clrMapOvr>
-  <p:timing>
-    <p:tnLst>
-      <p:par>
-        <p:cTn id="1" dur="indefinite" restart="never" nodeType="tmRoot"/>
-      </p:par>
-    </p:tnLst>
-  </p:timing>
 </p:sldLayout>
 </file>
 
@@ -15299,13 +14879,6 @@
   <p:clrMapOvr>
     <a:masterClrMapping/>
   </p:clrMapOvr>
-  <p:timing>
-    <p:tnLst>
-      <p:par>
-        <p:cTn id="1" dur="indefinite" restart="never" nodeType="tmRoot"/>
-      </p:par>
-    </p:tnLst>
-  </p:timing>
 </p:sldLayout>
 </file>
 
@@ -15423,13 +14996,6 @@
     <p:sldLayoutId id="2147483769" r:id="rId4"/>
     <p:sldLayoutId id="2147483770" r:id="rId5"/>
   </p:sldLayoutIdLst>
-  <p:timing>
-    <p:tnLst>
-      <p:par>
-        <p:cTn id="1" dur="indefinite" restart="never" nodeType="tmRoot"/>
-      </p:par>
-    </p:tnLst>
-  </p:timing>
   <p:txStyles>
     <p:titleStyle>
       <a:lvl1pPr algn="r" defTabSz="914400" rtl="0" eaLnBrk="1" latinLnBrk="0" hangingPunct="1">
@@ -16253,13 +15819,6 @@
     <p:sldLayoutId id="2147483796" r:id="rId16"/>
     <p:sldLayoutId id="2147483797" r:id="rId17"/>
   </p:sldLayoutIdLst>
-  <p:timing>
-    <p:tnLst>
-      <p:par>
-        <p:cTn id="1" dur="indefinite" restart="never" nodeType="tmRoot"/>
-      </p:par>
-    </p:tnLst>
-  </p:timing>
   <p:hf hdr="0" ftr="0" dt="0"/>
   <p:txStyles>
     <p:titleStyle>
@@ -17206,13 +16765,6 @@
     <p:sldLayoutId id="2147483732" r:id="rId7"/>
     <p:sldLayoutId id="2147483733" r:id="rId8"/>
   </p:sldLayoutIdLst>
-  <p:timing>
-    <p:tnLst>
-      <p:par>
-        <p:cTn id="1" dur="indefinite" restart="never" nodeType="tmRoot"/>
-      </p:par>
-    </p:tnLst>
-  </p:timing>
   <p:hf hdr="0" ftr="0" dt="0"/>
   <p:txStyles>
     <p:titleStyle>
@@ -18159,13 +17711,6 @@
     <p:sldLayoutId id="2147483739" r:id="rId7"/>
     <p:sldLayoutId id="2147483740" r:id="rId8"/>
   </p:sldLayoutIdLst>
-  <p:timing>
-    <p:tnLst>
-      <p:par>
-        <p:cTn id="1" dur="indefinite" restart="never" nodeType="tmRoot"/>
-      </p:par>
-    </p:tnLst>
-  </p:timing>
   <p:hf hdr="0" ftr="0" dt="0"/>
   <p:txStyles>
     <p:titleStyle>
@@ -19113,13 +18658,6 @@
     <p:sldLayoutId id="2147483747" r:id="rId8"/>
     <p:sldLayoutId id="2147483795" r:id="rId9"/>
   </p:sldLayoutIdLst>
-  <p:timing>
-    <p:tnLst>
-      <p:par>
-        <p:cTn id="1" dur="indefinite" restart="never" nodeType="tmRoot"/>
-      </p:par>
-    </p:tnLst>
-  </p:timing>
   <p:hf hdr="0" ftr="0" dt="0"/>
   <p:txStyles>
     <p:titleStyle>
@@ -20066,13 +19604,6 @@
     <p:sldLayoutId id="2147483753" r:id="rId7"/>
     <p:sldLayoutId id="2147483754" r:id="rId8"/>
   </p:sldLayoutIdLst>
-  <p:timing>
-    <p:tnLst>
-      <p:par>
-        <p:cTn id="1" dur="indefinite" restart="never" nodeType="tmRoot"/>
-      </p:par>
-    </p:tnLst>
-  </p:timing>
   <p:hf hdr="0" ftr="0" dt="0"/>
   <p:txStyles>
     <p:titleStyle>
@@ -21018,13 +20549,6 @@
     <p:sldLayoutId id="2147483763" r:id="rId6"/>
     <p:sldLayoutId id="2147483764" r:id="rId7"/>
   </p:sldLayoutIdLst>
-  <p:timing>
-    <p:tnLst>
-      <p:par>
-        <p:cTn id="1" dur="indefinite" restart="never" nodeType="tmRoot"/>
-      </p:par>
-    </p:tnLst>
-  </p:timing>
   <p:hf hdr="0" ftr="0" dt="0"/>
   <p:txStyles>
     <p:titleStyle>
@@ -21446,13 +20970,6 @@
   <p:clrMapOvr>
     <a:masterClrMapping/>
   </p:clrMapOvr>
-  <p:timing>
-    <p:tnLst>
-      <p:par>
-        <p:cTn id="1" dur="indefinite" restart="never" nodeType="tmRoot"/>
-      </p:par>
-    </p:tnLst>
-  </p:timing>
 </p:sld>
 </file>
 
@@ -21549,8 +21066,17 @@
           <a:p>
             <a:r>
               <a:rPr lang="en-US" dirty="0"/>
-              <a:t>Built on ASP.NET 5</a:t>
+              <a:t>Built </a:t>
             </a:r>
+            <a:r>
+              <a:rPr lang="en-US"/>
+              <a:t>on </a:t>
+            </a:r>
+            <a:r>
+              <a:rPr lang="en-US" smtClean="0"/>
+              <a:t>ASP.NET Core 1.0</a:t>
+            </a:r>
+            <a:endParaRPr lang="en-US" dirty="0"/>
           </a:p>
           <a:p>
             <a:r>
@@ -21579,13 +21105,6 @@
   <p:transition>
     <p:fade/>
   </p:transition>
-  <p:timing>
-    <p:tnLst>
-      <p:par>
-        <p:cTn id="1" dur="indefinite" restart="never" nodeType="tmRoot"/>
-      </p:par>
-    </p:tnLst>
-  </p:timing>
 </p:sld>
 </file>
 
@@ -22377,13 +21896,6 @@
   <p:transition>
     <p:fade/>
   </p:transition>
-  <p:timing>
-    <p:tnLst>
-      <p:par>
-        <p:cTn id="1" dur="indefinite" restart="never" nodeType="tmRoot"/>
-      </p:par>
-    </p:tnLst>
-  </p:timing>
 </p:sld>
 </file>
 
@@ -22512,13 +22024,6 @@
       <p:transition spd="slow"/>
     </mc:Fallback>
   </mc:AlternateContent>
-  <p:timing>
-    <p:tnLst>
-      <p:par>
-        <p:cTn id="1" dur="indefinite" restart="never" nodeType="tmRoot"/>
-      </p:par>
-    </p:tnLst>
-  </p:timing>
 </p:sld>
 </file>
 
@@ -22587,13 +22092,6 @@
       <p:transition spd="slow"/>
     </mc:Fallback>
   </mc:AlternateContent>
-  <p:timing>
-    <p:tnLst>
-      <p:par>
-        <p:cTn id="1" dur="indefinite" restart="never" nodeType="tmRoot"/>
-      </p:par>
-    </p:tnLst>
-  </p:timing>
 </p:sld>
 </file>
 
@@ -22662,13 +22160,6 @@
       <p:transition spd="slow"/>
     </mc:Fallback>
   </mc:AlternateContent>
-  <p:timing>
-    <p:tnLst>
-      <p:par>
-        <p:cTn id="1" dur="indefinite" restart="never" nodeType="tmRoot"/>
-      </p:par>
-    </p:tnLst>
-  </p:timing>
 </p:sld>
 </file>
 
@@ -22737,13 +22228,6 @@
       <p:transition spd="slow"/>
     </mc:Fallback>
   </mc:AlternateContent>
-  <p:timing>
-    <p:tnLst>
-      <p:par>
-        <p:cTn id="1" dur="indefinite" restart="never" nodeType="tmRoot"/>
-      </p:par>
-    </p:tnLst>
-  </p:timing>
 </p:sld>
 </file>
 
@@ -22812,13 +22296,6 @@
       <p:transition spd="slow"/>
     </mc:Fallback>
   </mc:AlternateContent>
-  <p:timing>
-    <p:tnLst>
-      <p:par>
-        <p:cTn id="1" dur="indefinite" restart="never" nodeType="tmRoot"/>
-      </p:par>
-    </p:tnLst>
-  </p:timing>
 </p:sld>
 </file>
 
@@ -22887,13 +22364,6 @@
       <p:transition spd="slow"/>
     </mc:Fallback>
   </mc:AlternateContent>
-  <p:timing>
-    <p:tnLst>
-      <p:par>
-        <p:cTn id="1" dur="indefinite" restart="never" nodeType="tmRoot"/>
-      </p:par>
-    </p:tnLst>
-  </p:timing>
 </p:sld>
 </file>
 
@@ -22962,13 +22432,6 @@
       <p:transition spd="slow"/>
     </mc:Fallback>
   </mc:AlternateContent>
-  <p:timing>
-    <p:tnLst>
-      <p:par>
-        <p:cTn id="1" dur="indefinite" restart="never" nodeType="tmRoot"/>
-      </p:par>
-    </p:tnLst>
-  </p:timing>
 </p:sld>
 </file>
 
@@ -23083,21 +22546,21 @@
                 <a:gridCol w="8350512">
                   <a:extLst>
                     <a:ext uri="{9D8B030D-6E8A-4147-A177-3AD203B41FA5}">
-                      <a16:colId xmlns="" xmlns:a16="http://schemas.microsoft.com/office/drawing/2014/main" val="20000"/>
+                      <a16:colId xmlns:a16="http://schemas.microsoft.com/office/drawing/2014/main" val="20000"/>
                     </a:ext>
                   </a:extLst>
                 </a:gridCol>
                 <a:gridCol w="1662043">
                   <a:extLst>
                     <a:ext uri="{9D8B030D-6E8A-4147-A177-3AD203B41FA5}">
-                      <a16:colId xmlns="" xmlns:a16="http://schemas.microsoft.com/office/drawing/2014/main" val="20001"/>
+                      <a16:colId xmlns:a16="http://schemas.microsoft.com/office/drawing/2014/main" val="20001"/>
                     </a:ext>
                   </a:extLst>
                 </a:gridCol>
                 <a:gridCol w="1470628">
                   <a:extLst>
                     <a:ext uri="{9D8B030D-6E8A-4147-A177-3AD203B41FA5}">
-                      <a16:colId xmlns="" xmlns:a16="http://schemas.microsoft.com/office/drawing/2014/main" val="20002"/>
+                      <a16:colId xmlns:a16="http://schemas.microsoft.com/office/drawing/2014/main" val="20002"/>
                     </a:ext>
                   </a:extLst>
                 </a:gridCol>
@@ -23147,7 +22610,7 @@
                 </a:tc>
                 <a:extLst>
                   <a:ext uri="{0D108BD9-81ED-4DB2-BD59-A6C34878D82A}">
-                    <a16:rowId xmlns="" xmlns:a16="http://schemas.microsoft.com/office/drawing/2014/main" val="10000"/>
+                    <a16:rowId xmlns:a16="http://schemas.microsoft.com/office/drawing/2014/main" val="10000"/>
                   </a:ext>
                 </a:extLst>
               </a:tr>
@@ -23232,7 +22695,7 @@
                 </a:tc>
                 <a:extLst>
                   <a:ext uri="{0D108BD9-81ED-4DB2-BD59-A6C34878D82A}">
-                    <a16:rowId xmlns="" xmlns:a16="http://schemas.microsoft.com/office/drawing/2014/main" val="10001"/>
+                    <a16:rowId xmlns:a16="http://schemas.microsoft.com/office/drawing/2014/main" val="10001"/>
                   </a:ext>
                 </a:extLst>
               </a:tr>
@@ -23305,7 +22768,7 @@
                 </a:tc>
                 <a:extLst>
                   <a:ext uri="{0D108BD9-81ED-4DB2-BD59-A6C34878D82A}">
-                    <a16:rowId xmlns="" xmlns:a16="http://schemas.microsoft.com/office/drawing/2014/main" val="10002"/>
+                    <a16:rowId xmlns:a16="http://schemas.microsoft.com/office/drawing/2014/main" val="10002"/>
                   </a:ext>
                 </a:extLst>
               </a:tr>
@@ -23378,7 +22841,7 @@
                 </a:tc>
                 <a:extLst>
                   <a:ext uri="{0D108BD9-81ED-4DB2-BD59-A6C34878D82A}">
-                    <a16:rowId xmlns="" xmlns:a16="http://schemas.microsoft.com/office/drawing/2014/main" val="10004"/>
+                    <a16:rowId xmlns:a16="http://schemas.microsoft.com/office/drawing/2014/main" val="10004"/>
                   </a:ext>
                 </a:extLst>
               </a:tr>
@@ -23451,7 +22914,7 @@
                 </a:tc>
                 <a:extLst>
                   <a:ext uri="{0D108BD9-81ED-4DB2-BD59-A6C34878D82A}">
-                    <a16:rowId xmlns="" xmlns:a16="http://schemas.microsoft.com/office/drawing/2014/main" val="10005"/>
+                    <a16:rowId xmlns:a16="http://schemas.microsoft.com/office/drawing/2014/main" val="10005"/>
                   </a:ext>
                 </a:extLst>
               </a:tr>
@@ -23524,7 +22987,7 @@
                 </a:tc>
                 <a:extLst>
                   <a:ext uri="{0D108BD9-81ED-4DB2-BD59-A6C34878D82A}">
-                    <a16:rowId xmlns="" xmlns:a16="http://schemas.microsoft.com/office/drawing/2014/main" val="10006"/>
+                    <a16:rowId xmlns:a16="http://schemas.microsoft.com/office/drawing/2014/main" val="10006"/>
                   </a:ext>
                 </a:extLst>
               </a:tr>
@@ -23595,6 +23058,11 @@
                   </a:txBody>
                   <a:tcPr marL="45720" marR="45720"/>
                 </a:tc>
+                <a:extLst>
+                  <a:ext uri="{0D108BD9-81ED-4DB2-BD59-A6C34878D82A}">
+                    <a16:rowId xmlns:a16="http://schemas.microsoft.com/office/drawing/2014/main" val="10008"/>
+                  </a:ext>
+                </a:extLst>
               </a:tr>
               <a:tr h="409188">
                 <a:tc>
@@ -23665,7 +23133,7 @@
                 </a:tc>
                 <a:extLst>
                   <a:ext uri="{0D108BD9-81ED-4DB2-BD59-A6C34878D82A}">
-                    <a16:rowId xmlns="" xmlns:a16="http://schemas.microsoft.com/office/drawing/2014/main" val="10007"/>
+                    <a16:rowId xmlns:a16="http://schemas.microsoft.com/office/drawing/2014/main" val="10007"/>
                   </a:ext>
                 </a:extLst>
               </a:tr>
@@ -23738,7 +23206,7 @@
                 </a:tc>
                 <a:extLst>
                   <a:ext uri="{0D108BD9-81ED-4DB2-BD59-A6C34878D82A}">
-                    <a16:rowId xmlns="" xmlns:a16="http://schemas.microsoft.com/office/drawing/2014/main" val="10009"/>
+                    <a16:rowId xmlns:a16="http://schemas.microsoft.com/office/drawing/2014/main" val="10009"/>
                   </a:ext>
                 </a:extLst>
               </a:tr>
@@ -23809,6 +23277,11 @@
                   </a:txBody>
                   <a:tcPr marL="45720" marR="45720"/>
                 </a:tc>
+                <a:extLst>
+                  <a:ext uri="{0D108BD9-81ED-4DB2-BD59-A6C34878D82A}">
+                    <a16:rowId xmlns:a16="http://schemas.microsoft.com/office/drawing/2014/main" val="10010"/>
+                  </a:ext>
+                </a:extLst>
               </a:tr>
               <a:tr h="409188">
                 <a:tc>
@@ -23887,7 +23360,7 @@
                 </a:tc>
                 <a:extLst>
                   <a:ext uri="{0D108BD9-81ED-4DB2-BD59-A6C34878D82A}">
-                    <a16:rowId xmlns="" xmlns:a16="http://schemas.microsoft.com/office/drawing/2014/main" val="10011"/>
+                    <a16:rowId xmlns:a16="http://schemas.microsoft.com/office/drawing/2014/main" val="10011"/>
                   </a:ext>
                 </a:extLst>
               </a:tr>
@@ -23905,13 +23378,6 @@
   <p:clrMapOvr>
     <a:masterClrMapping/>
   </p:clrMapOvr>
-  <p:timing>
-    <p:tnLst>
-      <p:par>
-        <p:cTn id="1" dur="indefinite" restart="never" nodeType="tmRoot"/>
-      </p:par>
-    </p:tnLst>
-  </p:timing>
 </p:sld>
 </file>
 
@@ -24020,13 +23486,6 @@
       <p:transition spd="slow"/>
     </mc:Fallback>
   </mc:AlternateContent>
-  <p:timing>
-    <p:tnLst>
-      <p:par>
-        <p:cTn id="1" dur="indefinite" restart="never" nodeType="tmRoot"/>
-      </p:par>
-    </p:tnLst>
-  </p:timing>
 </p:sld>
 </file>
 
@@ -25481,13 +24940,6 @@
   <p:clrMapOvr>
     <a:masterClrMapping/>
   </p:clrMapOvr>
-  <p:timing>
-    <p:tnLst>
-      <p:par>
-        <p:cTn id="1" dur="indefinite" restart="never" nodeType="tmRoot"/>
-      </p:par>
-    </p:tnLst>
-  </p:timing>
 </p:sld>
 </file>
 
@@ -25602,13 +25054,6 @@
   <p:clrMapOvr>
     <a:masterClrMapping/>
   </p:clrMapOvr>
-  <p:timing>
-    <p:tnLst>
-      <p:par>
-        <p:cTn id="1" dur="indefinite" restart="never" nodeType="tmRoot"/>
-      </p:par>
-    </p:tnLst>
-  </p:timing>
 </p:sld>
 </file>
 
@@ -25723,13 +25168,6 @@
   <p:clrMapOvr>
     <a:masterClrMapping/>
   </p:clrMapOvr>
-  <p:timing>
-    <p:tnLst>
-      <p:par>
-        <p:cTn id="1" dur="indefinite" restart="never" nodeType="tmRoot"/>
-      </p:par>
-    </p:tnLst>
-  </p:timing>
 </p:sld>
 </file>
 
@@ -25844,13 +25282,6 @@
   <p:clrMapOvr>
     <a:masterClrMapping/>
   </p:clrMapOvr>
-  <p:timing>
-    <p:tnLst>
-      <p:par>
-        <p:cTn id="1" dur="indefinite" restart="never" nodeType="tmRoot"/>
-      </p:par>
-    </p:tnLst>
-  </p:timing>
 </p:sld>
 </file>
 
@@ -26417,13 +25848,6 @@
       </p:transition>
     </mc:Fallback>
   </mc:AlternateContent>
-  <p:timing>
-    <p:tnLst>
-      <p:par>
-        <p:cTn id="1" dur="indefinite" restart="never" nodeType="tmRoot"/>
-      </p:par>
-    </p:tnLst>
-  </p:timing>
 </p:sld>
 </file>
 
@@ -26909,13 +26333,6 @@
       </p:transition>
     </mc:Fallback>
   </mc:AlternateContent>
-  <p:timing>
-    <p:tnLst>
-      <p:par>
-        <p:cTn id="1" dur="indefinite" restart="never" nodeType="tmRoot"/>
-      </p:par>
-    </p:tnLst>
-  </p:timing>
 </p:sld>
 </file>
 
@@ -26968,13 +26385,6 @@
       </p:transition>
     </mc:Fallback>
   </mc:AlternateContent>
-  <p:timing>
-    <p:tnLst>
-      <p:par>
-        <p:cTn id="1" dur="indefinite" restart="never" nodeType="tmRoot"/>
-      </p:par>
-    </p:tnLst>
-  </p:timing>
 </p:sld>
 </file>
 
@@ -27541,13 +26951,6 @@
       </p:transition>
     </mc:Fallback>
   </mc:AlternateContent>
-  <p:timing>
-    <p:tnLst>
-      <p:par>
-        <p:cTn id="1" dur="indefinite" restart="never" nodeType="tmRoot"/>
-      </p:par>
-    </p:tnLst>
-  </p:timing>
 </p:sld>
 </file>
 
@@ -30154,13 +29557,6 @@
   <p:transition>
     <p:wipe/>
   </p:transition>
-  <p:timing>
-    <p:tnLst>
-      <p:par>
-        <p:cTn id="1" dur="indefinite" restart="never" nodeType="tmRoot"/>
-      </p:par>
-    </p:tnLst>
-  </p:timing>
 </p:sld>
 </file>
 
@@ -30664,12 +30060,20 @@
                 <a:defRPr/>
               </a:pPr>
               <a:r>
+                <a:rPr lang="en-US" sz="1200" smtClean="0">
+                  <a:solidFill>
+                    <a:srgbClr val="FFFFFF"/>
+                  </a:solidFill>
+                </a:rPr>
+                <a:t>.NET Core 1.0 </a:t>
+              </a:r>
+              <a:r>
                 <a:rPr lang="en-US" sz="1200" dirty="0">
                   <a:solidFill>
                     <a:srgbClr val="FFFFFF"/>
                   </a:solidFill>
                 </a:rPr>
-                <a:t>.NET Core 5 Libraries</a:t>
+                <a:t>Libraries</a:t>
               </a:r>
             </a:p>
             <a:p>
@@ -33536,35 +32940,22 @@
           <a:p>
             <a:pPr algn="ctr" defTabSz="913990"/>
             <a:r>
-              <a:rPr lang="en-US" sz="2800" b="1" dirty="0">
+              <a:rPr lang="en-US" sz="2800" b="1" smtClean="0">
                 <a:solidFill>
                   <a:srgbClr val="FFFFFF"/>
                 </a:solidFill>
                 <a:latin typeface="Segoe UI Semibold" panose="020B0702040204020203" pitchFamily="34" charset="0"/>
                 <a:cs typeface="Segoe UI Semibold" panose="020B0702040204020203" pitchFamily="34" charset="0"/>
               </a:rPr>
-              <a:t>.NET </a:t>
+              <a:t>.NET Core 1.0 </a:t>
             </a:r>
-            <a:r>
-              <a:rPr lang="en-US" sz="2800" dirty="0">
-                <a:solidFill>
-                  <a:srgbClr val="FFFFFF"/>
-                </a:solidFill>
-                <a:latin typeface="Segoe UI Semibold" panose="020B0702040204020203" pitchFamily="34" charset="0"/>
-                <a:cs typeface="Segoe UI Semibold" panose="020B0702040204020203" pitchFamily="34" charset="0"/>
-              </a:rPr>
-              <a:t>Core 5</a:t>
-            </a:r>
-            <a:r>
-              <a:rPr lang="en-US" sz="2800" b="1" dirty="0">
-                <a:solidFill>
-                  <a:srgbClr val="FFFFFF"/>
-                </a:solidFill>
-                <a:latin typeface="Segoe UI Semibold" panose="020B0702040204020203" pitchFamily="34" charset="0"/>
-                <a:cs typeface="Segoe UI Semibold" panose="020B0702040204020203" pitchFamily="34" charset="0"/>
-              </a:rPr>
-              <a:t> </a:t>
-            </a:r>
+            <a:endParaRPr lang="en-US" sz="2800" b="1" dirty="0">
+              <a:solidFill>
+                <a:srgbClr val="FFFFFF"/>
+              </a:solidFill>
+              <a:latin typeface="Segoe UI Semibold" panose="020B0702040204020203" pitchFamily="34" charset="0"/>
+              <a:cs typeface="Segoe UI Semibold" panose="020B0702040204020203" pitchFamily="34" charset="0"/>
+            </a:endParaRPr>
           </a:p>
         </p:txBody>
       </p:sp>
@@ -34100,7 +33491,7 @@
               </a:spcAft>
             </a:pPr>
             <a:r>
-              <a:rPr lang="en-US" sz="1961" dirty="0">
+              <a:rPr lang="en-US" sz="1961" smtClean="0">
                 <a:gradFill>
                   <a:gsLst>
                     <a:gs pos="0">
@@ -34115,8 +33506,23 @@
                 <a:ea typeface="Segoe UI" pitchFamily="34" charset="0"/>
                 <a:cs typeface="Segoe UI" pitchFamily="34" charset="0"/>
               </a:rPr>
-              <a:t>ASP.NET 5</a:t>
+              <a:t>ASP.NET Core 1.0</a:t>
             </a:r>
+            <a:endParaRPr lang="en-US" sz="1961" dirty="0">
+              <a:gradFill>
+                <a:gsLst>
+                  <a:gs pos="0">
+                    <a:srgbClr val="FFFFFF"/>
+                  </a:gs>
+                  <a:gs pos="100000">
+                    <a:srgbClr val="FFFFFF"/>
+                  </a:gs>
+                </a:gsLst>
+                <a:lin ang="5400000" scaled="0"/>
+              </a:gradFill>
+              <a:ea typeface="Segoe UI" pitchFamily="34" charset="0"/>
+              <a:cs typeface="Segoe UI" pitchFamily="34" charset="0"/>
+            </a:endParaRPr>
           </a:p>
         </p:txBody>
       </p:sp>
@@ -34361,13 +33767,6 @@
   <p:transition>
     <p:fade/>
   </p:transition>
-  <p:timing>
-    <p:tnLst>
-      <p:par>
-        <p:cTn id="1" dur="indefinite" restart="never" nodeType="tmRoot"/>
-      </p:par>
-    </p:tnLst>
-  </p:timing>
 </p:sld>
 </file>
 
@@ -34588,35 +33987,22 @@
           <a:p>
             <a:pPr algn="ctr" defTabSz="895984"/>
             <a:r>
-              <a:rPr lang="en-US" sz="2745" b="1" dirty="0">
+              <a:rPr lang="en-US" sz="2745" b="1" smtClean="0">
                 <a:solidFill>
                   <a:srgbClr val="FFFFFF"/>
                 </a:solidFill>
                 <a:latin typeface="Segoe UI Semibold" panose="020B0702040204020203" pitchFamily="34" charset="0"/>
                 <a:cs typeface="Segoe UI Semibold" panose="020B0702040204020203" pitchFamily="34" charset="0"/>
               </a:rPr>
-              <a:t>.NET </a:t>
+              <a:t>.NET Core 1.0 </a:t>
             </a:r>
-            <a:r>
-              <a:rPr lang="en-US" sz="2745" dirty="0">
-                <a:solidFill>
-                  <a:srgbClr val="FFFFFF"/>
-                </a:solidFill>
-                <a:latin typeface="Segoe UI Semibold" panose="020B0702040204020203" pitchFamily="34" charset="0"/>
-                <a:cs typeface="Segoe UI Semibold" panose="020B0702040204020203" pitchFamily="34" charset="0"/>
-              </a:rPr>
-              <a:t>Core 5</a:t>
-            </a:r>
-            <a:r>
-              <a:rPr lang="en-US" sz="2745" b="1" dirty="0">
-                <a:solidFill>
-                  <a:srgbClr val="FFFFFF"/>
-                </a:solidFill>
-                <a:latin typeface="Segoe UI Semibold" panose="020B0702040204020203" pitchFamily="34" charset="0"/>
-                <a:cs typeface="Segoe UI Semibold" panose="020B0702040204020203" pitchFamily="34" charset="0"/>
-              </a:rPr>
-              <a:t> </a:t>
-            </a:r>
+            <a:endParaRPr lang="en-US" sz="2745" b="1" dirty="0">
+              <a:solidFill>
+                <a:srgbClr val="FFFFFF"/>
+              </a:solidFill>
+              <a:latin typeface="Segoe UI Semibold" panose="020B0702040204020203" pitchFamily="34" charset="0"/>
+              <a:cs typeface="Segoe UI Semibold" panose="020B0702040204020203" pitchFamily="34" charset="0"/>
+            </a:endParaRPr>
           </a:p>
         </p:txBody>
       </p:sp>
@@ -35315,7 +34701,7 @@
               </a:spcAft>
             </a:pPr>
             <a:r>
-              <a:rPr lang="en-US" sz="1922" dirty="0">
+              <a:rPr lang="en-US" sz="1922" smtClean="0">
                 <a:gradFill>
                   <a:gsLst>
                     <a:gs pos="0">
@@ -35330,8 +34716,23 @@
                 <a:ea typeface="Segoe UI" pitchFamily="34" charset="0"/>
                 <a:cs typeface="Segoe UI" pitchFamily="34" charset="0"/>
               </a:rPr>
-              <a:t>ASP.NET 5</a:t>
+              <a:t>ASP.NET Core 1.0</a:t>
             </a:r>
+            <a:endParaRPr lang="en-US" sz="1922" dirty="0">
+              <a:gradFill>
+                <a:gsLst>
+                  <a:gs pos="0">
+                    <a:srgbClr val="FFFFFF"/>
+                  </a:gs>
+                  <a:gs pos="100000">
+                    <a:srgbClr val="FFFFFF"/>
+                  </a:gs>
+                </a:gsLst>
+                <a:lin ang="5400000" scaled="0"/>
+              </a:gradFill>
+              <a:ea typeface="Segoe UI" pitchFamily="34" charset="0"/>
+              <a:cs typeface="Segoe UI" pitchFamily="34" charset="0"/>
+            </a:endParaRPr>
           </a:p>
         </p:txBody>
       </p:sp>
@@ -35781,13 +35182,6 @@
       <p:transition spd="slow"/>
     </mc:Fallback>
   </mc:AlternateContent>
-  <p:timing>
-    <p:tnLst>
-      <p:par>
-        <p:cTn id="1" dur="indefinite" restart="never" nodeType="tmRoot"/>
-      </p:par>
-    </p:tnLst>
-  </p:timing>
 </p:sld>
 </file>
 
@@ -35894,13 +35288,6 @@
       <p:transition spd="slow"/>
     </mc:Fallback>
   </mc:AlternateContent>
-  <p:timing>
-    <p:tnLst>
-      <p:par>
-        <p:cTn id="1" dur="indefinite" restart="never" nodeType="tmRoot"/>
-      </p:par>
-    </p:tnLst>
-  </p:timing>
 </p:sld>
 </file>
 

</xml_diff>